<commit_message>
subir projeto final do modulo 1
</commit_message>
<xml_diff>
--- a/presentation/PROJETO FINAL - MODULO 1.pptx
+++ b/presentation/PROJETO FINAL - MODULO 1.pptx
@@ -18,6 +18,7 @@
     <p:sldId id="270" r:id="rId12"/>
     <p:sldId id="268" r:id="rId13"/>
     <p:sldId id="269" r:id="rId14"/>
+    <p:sldId id="271" r:id="rId15"/>
   </p:sldIdLst>
   <p:sldSz cx="12192000" cy="6858000"/>
   <p:notesSz cx="6858000" cy="9144000"/>
@@ -116,13 +117,18 @@
       </a:defRPr>
     </a:lvl9pPr>
   </p:defaultTextStyle>
+  <p:extLst>
+    <p:ext uri="{EFAFB233-063F-42B5-8137-9DF3F51BA10A}">
+      <p15:sldGuideLst xmlns:p15="http://schemas.microsoft.com/office/powerpoint/2012/main"/>
+    </p:ext>
+  </p:extLst>
 </p:presentation>
 </file>
 
 <file path=ppt/revisionInfo.xml><?xml version="1.0" encoding="utf-8"?>
 <p1510:revInfo xmlns:a="http://schemas.openxmlformats.org/drawingml/2006/main" xmlns:r="http://schemas.openxmlformats.org/officeDocument/2006/relationships" xmlns:p1510="http://schemas.microsoft.com/office/powerpoint/2015/10/main">
   <p1510:revLst>
-    <p1510:client id="{C14783D2-E919-446A-BCA3-2160316DE2B4}" v="10" dt="2019-12-20T17:22:01.645"/>
+    <p1510:client id="{C14783D2-E919-446A-BCA3-2160316DE2B4}" v="198" dt="2019-12-20T18:06:50.193"/>
   </p1510:revLst>
 </p1510:revInfo>
 </file>
@@ -132,10 +138,25 @@
   <pc:docChgLst>
     <pc:chgData name="jefferson chan" userId="4a0e6ae519ce2169" providerId="LiveId" clId="{C14783D2-E919-446A-BCA3-2160316DE2B4}"/>
     <pc:docChg chg="undo custSel addSld modSld sldOrd">
-      <pc:chgData name="jefferson chan" userId="4a0e6ae519ce2169" providerId="LiveId" clId="{C14783D2-E919-446A-BCA3-2160316DE2B4}" dt="2019-12-20T17:22:12.497" v="58" actId="1076"/>
+      <pc:chgData name="jefferson chan" userId="4a0e6ae519ce2169" providerId="LiveId" clId="{C14783D2-E919-446A-BCA3-2160316DE2B4}" dt="2019-12-20T18:06:50.193" v="407" actId="1076"/>
       <pc:docMkLst>
         <pc:docMk/>
       </pc:docMkLst>
+      <pc:sldChg chg="modSp">
+        <pc:chgData name="jefferson chan" userId="4a0e6ae519ce2169" providerId="LiveId" clId="{C14783D2-E919-446A-BCA3-2160316DE2B4}" dt="2019-12-20T18:06:50.193" v="407" actId="1076"/>
+        <pc:sldMkLst>
+          <pc:docMk/>
+          <pc:sldMk cId="3282825228" sldId="267"/>
+        </pc:sldMkLst>
+        <pc:picChg chg="mod">
+          <ac:chgData name="jefferson chan" userId="4a0e6ae519ce2169" providerId="LiveId" clId="{C14783D2-E919-446A-BCA3-2160316DE2B4}" dt="2019-12-20T18:06:50.193" v="407" actId="1076"/>
+          <ac:picMkLst>
+            <pc:docMk/>
+            <pc:sldMk cId="3282825228" sldId="267"/>
+            <ac:picMk id="3074" creationId="{952E2365-4F6F-4C6E-BB2A-0DFCE97A8739}"/>
+          </ac:picMkLst>
+        </pc:picChg>
+      </pc:sldChg>
       <pc:sldChg chg="modSp">
         <pc:chgData name="jefferson chan" userId="4a0e6ae519ce2169" providerId="LiveId" clId="{C14783D2-E919-446A-BCA3-2160316DE2B4}" dt="2019-12-20T17:20:47.033" v="54" actId="1076"/>
         <pc:sldMkLst>
@@ -167,8 +188,23 @@
           </ac:picMkLst>
         </pc:picChg>
       </pc:sldChg>
+      <pc:sldChg chg="addSp delSp modSp">
+        <pc:chgData name="jefferson chan" userId="4a0e6ae519ce2169" providerId="LiveId" clId="{C14783D2-E919-446A-BCA3-2160316DE2B4}" dt="2019-12-20T17:56:17.018" v="66" actId="478"/>
+        <pc:sldMkLst>
+          <pc:docMk/>
+          <pc:sldMk cId="3512339018" sldId="269"/>
+        </pc:sldMkLst>
+        <pc:picChg chg="add del mod">
+          <ac:chgData name="jefferson chan" userId="4a0e6ae519ce2169" providerId="LiveId" clId="{C14783D2-E919-446A-BCA3-2160316DE2B4}" dt="2019-12-20T17:56:17.018" v="66" actId="478"/>
+          <ac:picMkLst>
+            <pc:docMk/>
+            <pc:sldMk cId="3512339018" sldId="269"/>
+            <ac:picMk id="1026" creationId="{108507F0-11EB-4839-9D2C-8FA61E12B7E5}"/>
+          </ac:picMkLst>
+        </pc:picChg>
+      </pc:sldChg>
       <pc:sldChg chg="addSp delSp modSp add ord">
-        <pc:chgData name="jefferson chan" userId="4a0e6ae519ce2169" providerId="LiveId" clId="{C14783D2-E919-446A-BCA3-2160316DE2B4}" dt="2019-12-20T17:22:12.497" v="58" actId="1076"/>
+        <pc:chgData name="jefferson chan" userId="4a0e6ae519ce2169" providerId="LiveId" clId="{C14783D2-E919-446A-BCA3-2160316DE2B4}" dt="2019-12-20T17:53:20.009" v="60"/>
         <pc:sldMkLst>
           <pc:docMk/>
           <pc:sldMk cId="2657989278" sldId="270"/>
@@ -203,6 +239,29 @@
             <pc:docMk/>
             <pc:sldMk cId="2657989278" sldId="270"/>
             <ac:picMk id="5" creationId="{D536F24C-B665-4409-B1D7-F9E32969D62C}"/>
+          </ac:picMkLst>
+        </pc:picChg>
+      </pc:sldChg>
+      <pc:sldChg chg="modSp add">
+        <pc:chgData name="jefferson chan" userId="4a0e6ae519ce2169" providerId="LiveId" clId="{C14783D2-E919-446A-BCA3-2160316DE2B4}" dt="2019-12-20T17:59:36.542" v="403" actId="1076"/>
+        <pc:sldMkLst>
+          <pc:docMk/>
+          <pc:sldMk cId="1243569246" sldId="271"/>
+        </pc:sldMkLst>
+        <pc:picChg chg="mod">
+          <ac:chgData name="jefferson chan" userId="4a0e6ae519ce2169" providerId="LiveId" clId="{C14783D2-E919-446A-BCA3-2160316DE2B4}" dt="2019-12-20T17:59:16.837" v="399" actId="29295"/>
+          <ac:picMkLst>
+            <pc:docMk/>
+            <pc:sldMk cId="1243569246" sldId="271"/>
+            <ac:picMk id="2" creationId="{3DA70A2F-B428-40A9-B376-3EEBCDCF5A6D}"/>
+          </ac:picMkLst>
+        </pc:picChg>
+        <pc:picChg chg="mod">
+          <ac:chgData name="jefferson chan" userId="4a0e6ae519ce2169" providerId="LiveId" clId="{C14783D2-E919-446A-BCA3-2160316DE2B4}" dt="2019-12-20T17:59:36.542" v="403" actId="1076"/>
+          <ac:picMkLst>
+            <pc:docMk/>
+            <pc:sldMk cId="1243569246" sldId="271"/>
+            <ac:picMk id="1026" creationId="{108507F0-11EB-4839-9D2C-8FA61E12B7E5}"/>
           </ac:picMkLst>
         </pc:picChg>
       </pc:sldChg>
@@ -3576,7 +3635,7 @@
         </p:blipFill>
         <p:spPr bwMode="auto">
           <a:xfrm>
-            <a:off x="1787703" y="431926"/>
+            <a:off x="1584711" y="411625"/>
             <a:ext cx="6580598" cy="6109647"/>
           </a:xfrm>
           <a:prstGeom prst="rect">
@@ -4023,6 +4082,129 @@
     <p:extLst>
       <p:ext uri="{BB962C8B-B14F-4D97-AF65-F5344CB8AC3E}">
         <p14:creationId xmlns:p14="http://schemas.microsoft.com/office/powerpoint/2010/main" val="3512339018"/>
+      </p:ext>
+    </p:extLst>
+  </p:cSld>
+  <p:clrMapOvr>
+    <a:masterClrMapping/>
+  </p:clrMapOvr>
+</p:sld>
+</file>
+
+<file path=ppt/slides/slide14.xml><?xml version="1.0" encoding="utf-8"?>
+<p:sld xmlns:a="http://schemas.openxmlformats.org/drawingml/2006/main" xmlns:r="http://schemas.openxmlformats.org/officeDocument/2006/relationships" xmlns:p="http://schemas.openxmlformats.org/presentationml/2006/main">
+  <p:cSld>
+    <p:spTree>
+      <p:nvGrpSpPr>
+        <p:cNvPr id="1" name=""/>
+        <p:cNvGrpSpPr/>
+        <p:nvPr/>
+      </p:nvGrpSpPr>
+      <p:grpSpPr>
+        <a:xfrm>
+          <a:off x="0" y="0"/>
+          <a:ext cx="0" cy="0"/>
+          <a:chOff x="0" y="0"/>
+          <a:chExt cx="0" cy="0"/>
+        </a:xfrm>
+      </p:grpSpPr>
+      <p:pic>
+        <p:nvPicPr>
+          <p:cNvPr id="2" name="Picture 2">
+            <a:extLst>
+              <a:ext uri="{FF2B5EF4-FFF2-40B4-BE49-F238E27FC236}">
+                <a16:creationId xmlns:a16="http://schemas.microsoft.com/office/drawing/2014/main" id="{3DA70A2F-B428-40A9-B376-3EEBCDCF5A6D}"/>
+              </a:ext>
+            </a:extLst>
+          </p:cNvPr>
+          <p:cNvPicPr>
+            <a:picLocks noChangeAspect="1" noChangeArrowheads="1"/>
+          </p:cNvPicPr>
+          <p:nvPr/>
+        </p:nvPicPr>
+        <p:blipFill>
+          <a:blip r:embed="rId2">
+            <a:alphaModFix amt="30000"/>
+            <a:extLst>
+              <a:ext uri="{28A0092B-C50C-407E-A947-70E740481C1C}">
+                <a14:useLocalDpi xmlns:a14="http://schemas.microsoft.com/office/drawing/2010/main" val="0"/>
+              </a:ext>
+            </a:extLst>
+          </a:blip>
+          <a:srcRect/>
+          <a:stretch>
+            <a:fillRect/>
+          </a:stretch>
+        </p:blipFill>
+        <p:spPr bwMode="auto">
+          <a:xfrm>
+            <a:off x="3107933" y="718055"/>
+            <a:ext cx="5867990" cy="5610826"/>
+          </a:xfrm>
+          <a:prstGeom prst="rect">
+            <a:avLst/>
+          </a:prstGeom>
+          <a:noFill/>
+          <a:effectLst>
+            <a:outerShdw blurRad="1270000" dist="50800" dir="5400000" algn="ctr" rotWithShape="0">
+              <a:srgbClr val="000000">
+                <a:alpha val="0"/>
+              </a:srgbClr>
+            </a:outerShdw>
+          </a:effectLst>
+        </p:spPr>
+      </p:pic>
+      <p:pic>
+        <p:nvPicPr>
+          <p:cNvPr id="1026" name="Picture 2" descr="Image result for &quot;no free lunch&quot; stamp">
+            <a:extLst>
+              <a:ext uri="{FF2B5EF4-FFF2-40B4-BE49-F238E27FC236}">
+                <a16:creationId xmlns:a16="http://schemas.microsoft.com/office/drawing/2014/main" id="{108507F0-11EB-4839-9D2C-8FA61E12B7E5}"/>
+              </a:ext>
+            </a:extLst>
+          </p:cNvPr>
+          <p:cNvPicPr>
+            <a:picLocks noChangeAspect="1" noChangeArrowheads="1"/>
+          </p:cNvPicPr>
+          <p:nvPr/>
+        </p:nvPicPr>
+        <p:blipFill>
+          <a:blip r:embed="rId3">
+            <a:extLst>
+              <a:ext uri="{28A0092B-C50C-407E-A947-70E740481C1C}">
+                <a14:useLocalDpi xmlns:a14="http://schemas.microsoft.com/office/drawing/2010/main" val="0"/>
+              </a:ext>
+            </a:extLst>
+          </a:blip>
+          <a:srcRect/>
+          <a:stretch>
+            <a:fillRect/>
+          </a:stretch>
+        </p:blipFill>
+        <p:spPr bwMode="auto">
+          <a:xfrm>
+            <a:off x="4360381" y="1645577"/>
+            <a:ext cx="3826628" cy="3243923"/>
+          </a:xfrm>
+          <a:prstGeom prst="rect">
+            <a:avLst/>
+          </a:prstGeom>
+          <a:noFill/>
+          <a:extLst>
+            <a:ext uri="{909E8E84-426E-40DD-AFC4-6F175D3DCCD1}">
+              <a14:hiddenFill xmlns:a14="http://schemas.microsoft.com/office/drawing/2010/main">
+                <a:solidFill>
+                  <a:srgbClr val="FFFFFF"/>
+                </a:solidFill>
+              </a14:hiddenFill>
+            </a:ext>
+          </a:extLst>
+        </p:spPr>
+      </p:pic>
+    </p:spTree>
+    <p:extLst>
+      <p:ext uri="{BB962C8B-B14F-4D97-AF65-F5344CB8AC3E}">
+        <p14:creationId xmlns:p14="http://schemas.microsoft.com/office/powerpoint/2010/main" val="1243569246"/>
       </p:ext>
     </p:extLst>
   </p:cSld>

</xml_diff>